<commit_message>
Added images of synthetic GT to meeting pp
</commit_message>
<xml_diff>
--- a/Meeting Presentations/12.01.2023_General Meeting.pptx
+++ b/Meeting Presentations/12.01.2023_General Meeting.pptx
@@ -9,7 +9,10 @@
     <p:sldId id="257" r:id="rId3"/>
     <p:sldId id="258" r:id="rId4"/>
     <p:sldId id="259" r:id="rId5"/>
-    <p:sldId id="260" r:id="rId6"/>
+    <p:sldId id="261" r:id="rId6"/>
+    <p:sldId id="262" r:id="rId7"/>
+    <p:sldId id="263" r:id="rId8"/>
+    <p:sldId id="260" r:id="rId9"/>
   </p:sldIdLst>
   <p:sldSz cx="12192000" cy="6858000"/>
   <p:notesSz cx="6858000" cy="9144000"/>
@@ -108,6 +111,11 @@
       </a:defRPr>
     </a:lvl9pPr>
   </p:defaultTextStyle>
+  <p:extLst>
+    <p:ext uri="{EFAFB233-063F-42B5-8137-9DF3F51BA10A}">
+      <p15:sldGuideLst xmlns:p15="http://schemas.microsoft.com/office/powerpoint/2012/main"/>
+    </p:ext>
+  </p:extLst>
 </p:presentation>
 </file>
 
@@ -269,7 +277,7 @@
           <a:p>
             <a:fld id="{655A5808-3B61-48CC-92EF-85AC2E0DFA56}" type="datetime2">
               <a:rPr lang="en-US" smtClean="0"/>
-              <a:t>Monday, January 9, 2023</a:t>
+              <a:t>Tuesday, January 10, 2023</a:t>
             </a:fld>
             <a:endParaRPr lang="en-US"/>
           </a:p>
@@ -467,7 +475,7 @@
           <a:p>
             <a:fld id="{735E98AF-4574-4509-BF7A-519ACD5BF826}" type="datetime2">
               <a:rPr lang="en-US" smtClean="0"/>
-              <a:t>Monday, January 9, 2023</a:t>
+              <a:t>Tuesday, January 10, 2023</a:t>
             </a:fld>
             <a:endParaRPr lang="en-US"/>
           </a:p>
@@ -677,7 +685,7 @@
           <a:p>
             <a:fld id="{93DD97D4-9636-490F-85D0-E926C2B6F3B1}" type="datetime2">
               <a:rPr lang="en-US" smtClean="0"/>
-              <a:t>Monday, January 9, 2023</a:t>
+              <a:t>Tuesday, January 10, 2023</a:t>
             </a:fld>
             <a:endParaRPr lang="en-US"/>
           </a:p>
@@ -876,7 +884,7 @@
           <a:p>
             <a:fld id="{2F3AF3C6-0FD4-4939-991C-00DDE5C56815}" type="datetime2">
               <a:rPr lang="en-US" smtClean="0"/>
-              <a:t>Monday, January 9, 2023</a:t>
+              <a:t>Tuesday, January 10, 2023</a:t>
             </a:fld>
             <a:endParaRPr lang="en-US"/>
           </a:p>
@@ -1157,7 +1165,7 @@
           <a:p>
             <a:fld id="{86807482-8128-47C6-A8DD-6452B0291CFF}" type="datetime2">
               <a:rPr lang="en-US" smtClean="0"/>
-              <a:t>Monday, January 9, 2023</a:t>
+              <a:t>Tuesday, January 10, 2023</a:t>
             </a:fld>
             <a:endParaRPr lang="en-US"/>
           </a:p>
@@ -1425,7 +1433,7 @@
           <a:p>
             <a:fld id="{37903F25-275E-41DE-BE3B-EBF0DB49F9B1}" type="datetime2">
               <a:rPr lang="en-US" smtClean="0"/>
-              <a:t>Monday, January 9, 2023</a:t>
+              <a:t>Tuesday, January 10, 2023</a:t>
             </a:fld>
             <a:endParaRPr lang="en-US"/>
           </a:p>
@@ -1806,7 +1814,7 @@
           <a:p>
             <a:fld id="{EE475572-4A44-4171-84AA-64D42C8050A6}" type="datetime2">
               <a:rPr lang="en-US" smtClean="0"/>
-              <a:t>Monday, January 9, 2023</a:t>
+              <a:t>Tuesday, January 10, 2023</a:t>
             </a:fld>
             <a:endParaRPr lang="en-US"/>
           </a:p>
@@ -1976,7 +1984,7 @@
           <a:p>
             <a:fld id="{C4C1612E-528E-4FD5-9E9E-E15F1108F171}" type="datetime2">
               <a:rPr lang="en-US" smtClean="0"/>
-              <a:t>Monday, January 9, 2023</a:t>
+              <a:t>Tuesday, January 10, 2023</a:t>
             </a:fld>
             <a:endParaRPr lang="en-US"/>
           </a:p>
@@ -2089,7 +2097,7 @@
           <a:p>
             <a:fld id="{D4F6D862-A06D-436F-A92E-EBAAD50B6E50}" type="datetime2">
               <a:rPr lang="en-US" smtClean="0"/>
-              <a:t>Monday, January 9, 2023</a:t>
+              <a:t>Tuesday, January 10, 2023</a:t>
             </a:fld>
             <a:endParaRPr lang="en-US"/>
           </a:p>
@@ -2406,7 +2414,7 @@
           <a:p>
             <a:fld id="{B73E0B7D-2260-4809-8F0A-9E5F3E24F169}" type="datetime2">
               <a:rPr lang="en-US" smtClean="0"/>
-              <a:t>Monday, January 9, 2023</a:t>
+              <a:t>Tuesday, January 10, 2023</a:t>
             </a:fld>
             <a:endParaRPr lang="en-US"/>
           </a:p>
@@ -2698,7 +2706,7 @@
           <a:p>
             <a:fld id="{3C8E4735-C637-46A3-94EB-AB3AC4188D2F}" type="datetime2">
               <a:rPr lang="en-US" smtClean="0"/>
-              <a:t>Monday, January 9, 2023</a:t>
+              <a:t>Tuesday, January 10, 2023</a:t>
             </a:fld>
             <a:endParaRPr lang="en-US"/>
           </a:p>
@@ -3066,7 +3074,7 @@
             <a:fld id="{AE0C963C-C1DB-4AFD-9DDC-0691666BF49B}" type="datetime2">
               <a:rPr lang="en-US" smtClean="0"/>
               <a:pPr/>
-              <a:t>Monday, January 9, 2023</a:t>
+              <a:t>Tuesday, January 10, 2023</a:t>
             </a:fld>
             <a:endParaRPr lang="en-US" cap="all" dirty="0"/>
           </a:p>
@@ -4515,6 +4523,238 @@
           <a:chExt cx="0" cy="0"/>
         </a:xfrm>
       </p:grpSpPr>
+      <p:pic>
+        <p:nvPicPr>
+          <p:cNvPr id="5" name="Picture 4" descr="Chart&#10;&#10;Description automatically generated">
+            <a:extLst>
+              <a:ext uri="{FF2B5EF4-FFF2-40B4-BE49-F238E27FC236}">
+                <a16:creationId xmlns:a16="http://schemas.microsoft.com/office/drawing/2014/main" id="{8A2A78F7-683A-135D-FB1E-295828AB89FF}"/>
+              </a:ext>
+            </a:extLst>
+          </p:cNvPr>
+          <p:cNvPicPr>
+            <a:picLocks noChangeAspect="1"/>
+          </p:cNvPicPr>
+          <p:nvPr/>
+        </p:nvPicPr>
+        <p:blipFill>
+          <a:blip r:embed="rId2">
+            <a:extLst>
+              <a:ext uri="{28A0092B-C50C-407E-A947-70E740481C1C}">
+                <a14:useLocalDpi xmlns:a14="http://schemas.microsoft.com/office/drawing/2010/main" val="0"/>
+              </a:ext>
+            </a:extLst>
+          </a:blip>
+          <a:stretch>
+            <a:fillRect/>
+          </a:stretch>
+        </p:blipFill>
+        <p:spPr>
+          <a:xfrm>
+            <a:off x="1238250" y="0"/>
+            <a:ext cx="9477375" cy="6384648"/>
+          </a:xfrm>
+          <a:prstGeom prst="rect">
+            <a:avLst/>
+          </a:prstGeom>
+        </p:spPr>
+      </p:pic>
+    </p:spTree>
+    <p:extLst>
+      <p:ext uri="{BB962C8B-B14F-4D97-AF65-F5344CB8AC3E}">
+        <p14:creationId xmlns:p14="http://schemas.microsoft.com/office/powerpoint/2010/main" val="2243019436"/>
+      </p:ext>
+    </p:extLst>
+  </p:cSld>
+  <p:clrMapOvr>
+    <a:masterClrMapping/>
+  </p:clrMapOvr>
+</p:sld>
+</file>
+
+<file path=ppt/slides/slide6.xml><?xml version="1.0" encoding="utf-8"?>
+<p:sld xmlns:a="http://schemas.openxmlformats.org/drawingml/2006/main" xmlns:r="http://schemas.openxmlformats.org/officeDocument/2006/relationships" xmlns:p="http://schemas.openxmlformats.org/presentationml/2006/main">
+  <p:cSld>
+    <p:spTree>
+      <p:nvGrpSpPr>
+        <p:cNvPr id="1" name=""/>
+        <p:cNvGrpSpPr/>
+        <p:nvPr/>
+      </p:nvGrpSpPr>
+      <p:grpSpPr>
+        <a:xfrm>
+          <a:off x="0" y="0"/>
+          <a:ext cx="0" cy="0"/>
+          <a:chOff x="0" y="0"/>
+          <a:chExt cx="0" cy="0"/>
+        </a:xfrm>
+      </p:grpSpPr>
+      <p:pic>
+        <p:nvPicPr>
+          <p:cNvPr id="5" name="Picture 4" descr="Chart&#10;&#10;Description automatically generated">
+            <a:extLst>
+              <a:ext uri="{FF2B5EF4-FFF2-40B4-BE49-F238E27FC236}">
+                <a16:creationId xmlns:a16="http://schemas.microsoft.com/office/drawing/2014/main" id="{21D25EDE-3843-7D99-A37B-A823ACF6E418}"/>
+              </a:ext>
+            </a:extLst>
+          </p:cNvPr>
+          <p:cNvPicPr>
+            <a:picLocks noChangeAspect="1"/>
+          </p:cNvPicPr>
+          <p:nvPr/>
+        </p:nvPicPr>
+        <p:blipFill>
+          <a:blip r:embed="rId2">
+            <a:extLst>
+              <a:ext uri="{28A0092B-C50C-407E-A947-70E740481C1C}">
+                <a14:useLocalDpi xmlns:a14="http://schemas.microsoft.com/office/drawing/2010/main" val="0"/>
+              </a:ext>
+            </a:extLst>
+          </a:blip>
+          <a:stretch>
+            <a:fillRect/>
+          </a:stretch>
+        </p:blipFill>
+        <p:spPr>
+          <a:xfrm>
+            <a:off x="453378" y="1139184"/>
+            <a:ext cx="5852172" cy="4389129"/>
+          </a:xfrm>
+          <a:prstGeom prst="rect">
+            <a:avLst/>
+          </a:prstGeom>
+        </p:spPr>
+      </p:pic>
+      <p:pic>
+        <p:nvPicPr>
+          <p:cNvPr id="7" name="Picture 6" descr="Chart&#10;&#10;Description automatically generated">
+            <a:extLst>
+              <a:ext uri="{FF2B5EF4-FFF2-40B4-BE49-F238E27FC236}">
+                <a16:creationId xmlns:a16="http://schemas.microsoft.com/office/drawing/2014/main" id="{998AD335-8D82-5C2D-877A-7CBAB202E7EC}"/>
+              </a:ext>
+            </a:extLst>
+          </p:cNvPr>
+          <p:cNvPicPr>
+            <a:picLocks noChangeAspect="1"/>
+          </p:cNvPicPr>
+          <p:nvPr/>
+        </p:nvPicPr>
+        <p:blipFill>
+          <a:blip r:embed="rId3">
+            <a:extLst>
+              <a:ext uri="{28A0092B-C50C-407E-A947-70E740481C1C}">
+                <a14:useLocalDpi xmlns:a14="http://schemas.microsoft.com/office/drawing/2010/main" val="0"/>
+              </a:ext>
+            </a:extLst>
+          </a:blip>
+          <a:stretch>
+            <a:fillRect/>
+          </a:stretch>
+        </p:blipFill>
+        <p:spPr>
+          <a:xfrm>
+            <a:off x="5886450" y="1139183"/>
+            <a:ext cx="5852172" cy="4389129"/>
+          </a:xfrm>
+          <a:prstGeom prst="rect">
+            <a:avLst/>
+          </a:prstGeom>
+        </p:spPr>
+      </p:pic>
+    </p:spTree>
+    <p:extLst>
+      <p:ext uri="{BB962C8B-B14F-4D97-AF65-F5344CB8AC3E}">
+        <p14:creationId xmlns:p14="http://schemas.microsoft.com/office/powerpoint/2010/main" val="3184184564"/>
+      </p:ext>
+    </p:extLst>
+  </p:cSld>
+  <p:clrMapOvr>
+    <a:masterClrMapping/>
+  </p:clrMapOvr>
+</p:sld>
+</file>
+
+<file path=ppt/slides/slide7.xml><?xml version="1.0" encoding="utf-8"?>
+<p:sld xmlns:a="http://schemas.openxmlformats.org/drawingml/2006/main" xmlns:r="http://schemas.openxmlformats.org/officeDocument/2006/relationships" xmlns:p="http://schemas.openxmlformats.org/presentationml/2006/main">
+  <p:cSld>
+    <p:spTree>
+      <p:nvGrpSpPr>
+        <p:cNvPr id="1" name=""/>
+        <p:cNvGrpSpPr/>
+        <p:nvPr/>
+      </p:nvGrpSpPr>
+      <p:grpSpPr>
+        <a:xfrm>
+          <a:off x="0" y="0"/>
+          <a:ext cx="0" cy="0"/>
+          <a:chOff x="0" y="0"/>
+          <a:chExt cx="0" cy="0"/>
+        </a:xfrm>
+      </p:grpSpPr>
+      <p:pic>
+        <p:nvPicPr>
+          <p:cNvPr id="5" name="Content Placeholder 4" descr="Graphical user interface, chart&#10;&#10;Description automatically generated">
+            <a:extLst>
+              <a:ext uri="{FF2B5EF4-FFF2-40B4-BE49-F238E27FC236}">
+                <a16:creationId xmlns:a16="http://schemas.microsoft.com/office/drawing/2014/main" id="{27382869-4C43-2AE2-9467-57789D3EB709}"/>
+              </a:ext>
+            </a:extLst>
+          </p:cNvPr>
+          <p:cNvPicPr>
+            <a:picLocks noGrp="1" noChangeAspect="1"/>
+          </p:cNvPicPr>
+          <p:nvPr>
+            <p:ph idx="1"/>
+          </p:nvPr>
+        </p:nvPicPr>
+        <p:blipFill rotWithShape="1">
+          <a:blip r:embed="rId2">
+            <a:extLst>
+              <a:ext uri="{28A0092B-C50C-407E-A947-70E740481C1C}">
+                <a14:useLocalDpi xmlns:a14="http://schemas.microsoft.com/office/drawing/2010/main" val="0"/>
+              </a:ext>
+            </a:extLst>
+          </a:blip>
+          <a:srcRect l="12413" r="12540"/>
+          <a:stretch/>
+        </p:blipFill>
+        <p:spPr>
+          <a:xfrm>
+            <a:off x="266700" y="535780"/>
+            <a:ext cx="8753475" cy="5786439"/>
+          </a:xfrm>
+        </p:spPr>
+      </p:pic>
+    </p:spTree>
+    <p:extLst>
+      <p:ext uri="{BB962C8B-B14F-4D97-AF65-F5344CB8AC3E}">
+        <p14:creationId xmlns:p14="http://schemas.microsoft.com/office/powerpoint/2010/main" val="479443976"/>
+      </p:ext>
+    </p:extLst>
+  </p:cSld>
+  <p:clrMapOvr>
+    <a:masterClrMapping/>
+  </p:clrMapOvr>
+</p:sld>
+</file>
+
+<file path=ppt/slides/slide8.xml><?xml version="1.0" encoding="utf-8"?>
+<p:sld xmlns:a="http://schemas.openxmlformats.org/drawingml/2006/main" xmlns:r="http://schemas.openxmlformats.org/officeDocument/2006/relationships" xmlns:p="http://schemas.openxmlformats.org/presentationml/2006/main">
+  <p:cSld>
+    <p:spTree>
+      <p:nvGrpSpPr>
+        <p:cNvPr id="1" name=""/>
+        <p:cNvGrpSpPr/>
+        <p:nvPr/>
+      </p:nvGrpSpPr>
+      <p:grpSpPr>
+        <a:xfrm>
+          <a:off x="0" y="0"/>
+          <a:ext cx="0" cy="0"/>
+          <a:chOff x="0" y="0"/>
+          <a:chExt cx="0" cy="0"/>
+        </a:xfrm>
+      </p:grpSpPr>
       <p:sp>
         <p:nvSpPr>
           <p:cNvPr id="2" name="Title 1">

</xml_diff>

<commit_message>
Added some changes to the meeting
</commit_message>
<xml_diff>
--- a/Meeting Presentations/12.01.2023_General Meeting.pptx
+++ b/Meeting Presentations/12.01.2023_General Meeting.pptx
@@ -8,11 +8,14 @@
     <p:sldId id="256" r:id="rId2"/>
     <p:sldId id="257" r:id="rId3"/>
     <p:sldId id="258" r:id="rId4"/>
-    <p:sldId id="259" r:id="rId5"/>
-    <p:sldId id="261" r:id="rId6"/>
-    <p:sldId id="262" r:id="rId7"/>
-    <p:sldId id="263" r:id="rId8"/>
-    <p:sldId id="260" r:id="rId9"/>
+    <p:sldId id="266" r:id="rId5"/>
+    <p:sldId id="259" r:id="rId6"/>
+    <p:sldId id="261" r:id="rId7"/>
+    <p:sldId id="265" r:id="rId8"/>
+    <p:sldId id="262" r:id="rId9"/>
+    <p:sldId id="263" r:id="rId10"/>
+    <p:sldId id="264" r:id="rId11"/>
+    <p:sldId id="260" r:id="rId12"/>
   </p:sldIdLst>
   <p:sldSz cx="12192000" cy="6858000"/>
   <p:notesSz cx="6858000" cy="9144000"/>
@@ -3990,6 +3993,621 @@
 </p:sld>
 </file>
 
+<file path=ppt/slides/slide10.xml><?xml version="1.0" encoding="utf-8"?>
+<p:sld xmlns:a="http://schemas.openxmlformats.org/drawingml/2006/main" xmlns:r="http://schemas.openxmlformats.org/officeDocument/2006/relationships" xmlns:p="http://schemas.openxmlformats.org/presentationml/2006/main">
+  <p:cSld>
+    <p:spTree>
+      <p:nvGrpSpPr>
+        <p:cNvPr id="1" name=""/>
+        <p:cNvGrpSpPr/>
+        <p:nvPr/>
+      </p:nvGrpSpPr>
+      <p:grpSpPr>
+        <a:xfrm>
+          <a:off x="0" y="0"/>
+          <a:ext cx="0" cy="0"/>
+          <a:chOff x="0" y="0"/>
+          <a:chExt cx="0" cy="0"/>
+        </a:xfrm>
+      </p:grpSpPr>
+      <p:sp>
+        <p:nvSpPr>
+          <p:cNvPr id="2" name="Title 1">
+            <a:extLst>
+              <a:ext uri="{FF2B5EF4-FFF2-40B4-BE49-F238E27FC236}">
+                <a16:creationId xmlns:a16="http://schemas.microsoft.com/office/drawing/2014/main" id="{B565CB6D-1F6F-4424-8695-FAF5D2819ABC}"/>
+              </a:ext>
+            </a:extLst>
+          </p:cNvPr>
+          <p:cNvSpPr>
+            <a:spLocks noGrp="1"/>
+          </p:cNvSpPr>
+          <p:nvPr>
+            <p:ph type="title"/>
+          </p:nvPr>
+        </p:nvSpPr>
+        <p:spPr/>
+        <p:txBody>
+          <a:bodyPr/>
+          <a:lstStyle/>
+          <a:p>
+            <a:r>
+              <a:rPr lang="nb-NO" dirty="0" err="1"/>
+              <a:t>Various</a:t>
+            </a:r>
+            <a:r>
+              <a:rPr lang="nb-NO" dirty="0"/>
+              <a:t> </a:t>
+            </a:r>
+            <a:r>
+              <a:rPr lang="nb-NO" dirty="0" err="1"/>
+              <a:t>models</a:t>
+            </a:r>
+            <a:endParaRPr lang="en-GB" dirty="0"/>
+          </a:p>
+        </p:txBody>
+      </p:sp>
+      <p:graphicFrame>
+        <p:nvGraphicFramePr>
+          <p:cNvPr id="5" name="Table 5">
+            <a:extLst>
+              <a:ext uri="{FF2B5EF4-FFF2-40B4-BE49-F238E27FC236}">
+                <a16:creationId xmlns:a16="http://schemas.microsoft.com/office/drawing/2014/main" id="{42E02193-BB7C-404B-A1EB-B361FA1BDEFE}"/>
+              </a:ext>
+            </a:extLst>
+          </p:cNvPr>
+          <p:cNvGraphicFramePr>
+            <a:graphicFrameLocks noGrp="1"/>
+          </p:cNvGraphicFramePr>
+          <p:nvPr>
+            <p:extLst>
+              <p:ext uri="{D42A27DB-BD31-4B8C-83A1-F6EECF244321}">
+                <p14:modId xmlns:p14="http://schemas.microsoft.com/office/powerpoint/2010/main" val="4046205903"/>
+              </p:ext>
+            </p:extLst>
+          </p:nvPr>
+        </p:nvGraphicFramePr>
+        <p:xfrm>
+          <a:off x="1039778" y="2402552"/>
+          <a:ext cx="9456365" cy="2694742"/>
+        </p:xfrm>
+        <a:graphic>
+          <a:graphicData uri="http://schemas.openxmlformats.org/drawingml/2006/table">
+            <a:tbl>
+              <a:tblPr firstRow="1" bandRow="1">
+                <a:tableStyleId>{5C22544A-7EE6-4342-B048-85BDC9FD1C3A}</a:tableStyleId>
+              </a:tblPr>
+              <a:tblGrid>
+                <a:gridCol w="3152121">
+                  <a:extLst>
+                    <a:ext uri="{9D8B030D-6E8A-4147-A177-3AD203B41FA5}">
+                      <a16:colId xmlns:a16="http://schemas.microsoft.com/office/drawing/2014/main" val="1144517850"/>
+                    </a:ext>
+                  </a:extLst>
+                </a:gridCol>
+                <a:gridCol w="1576061">
+                  <a:extLst>
+                    <a:ext uri="{9D8B030D-6E8A-4147-A177-3AD203B41FA5}">
+                      <a16:colId xmlns:a16="http://schemas.microsoft.com/office/drawing/2014/main" val="3754495001"/>
+                    </a:ext>
+                  </a:extLst>
+                </a:gridCol>
+                <a:gridCol w="1576061">
+                  <a:extLst>
+                    <a:ext uri="{9D8B030D-6E8A-4147-A177-3AD203B41FA5}">
+                      <a16:colId xmlns:a16="http://schemas.microsoft.com/office/drawing/2014/main" val="2933673486"/>
+                    </a:ext>
+                  </a:extLst>
+                </a:gridCol>
+                <a:gridCol w="1576061">
+                  <a:extLst>
+                    <a:ext uri="{9D8B030D-6E8A-4147-A177-3AD203B41FA5}">
+                      <a16:colId xmlns:a16="http://schemas.microsoft.com/office/drawing/2014/main" val="1912250896"/>
+                    </a:ext>
+                  </a:extLst>
+                </a:gridCol>
+                <a:gridCol w="1576061">
+                  <a:extLst>
+                    <a:ext uri="{9D8B030D-6E8A-4147-A177-3AD203B41FA5}">
+                      <a16:colId xmlns:a16="http://schemas.microsoft.com/office/drawing/2014/main" val="3436529006"/>
+                    </a:ext>
+                  </a:extLst>
+                </a:gridCol>
+              </a:tblGrid>
+              <a:tr h="989905">
+                <a:tc>
+                  <a:txBody>
+                    <a:bodyPr/>
+                    <a:lstStyle/>
+                    <a:p>
+                      <a:pPr algn="ctr"/>
+                      <a:endParaRPr lang="en-GB"/>
+                    </a:p>
+                  </a:txBody>
+                  <a:tcPr anchor="ctr"/>
+                </a:tc>
+                <a:tc gridSpan="2">
+                  <a:txBody>
+                    <a:bodyPr/>
+                    <a:lstStyle/>
+                    <a:p>
+                      <a:pPr algn="ctr"/>
+                      <a:r>
+                        <a:rPr lang="nb-NO" dirty="0" err="1"/>
+                        <a:t>Synthetic</a:t>
+                      </a:r>
+                      <a:r>
+                        <a:rPr lang="nb-NO" dirty="0"/>
+                        <a:t> </a:t>
+                      </a:r>
+                      <a:r>
+                        <a:rPr lang="nb-NO" dirty="0" err="1"/>
+                        <a:t>dataset</a:t>
+                      </a:r>
+                      <a:r>
+                        <a:rPr lang="nb-NO" dirty="0"/>
+                        <a:t> [SEAM]</a:t>
+                      </a:r>
+                      <a:endParaRPr lang="en-GB" dirty="0"/>
+                    </a:p>
+                  </a:txBody>
+                  <a:tcPr anchor="ctr"/>
+                </a:tc>
+                <a:tc hMerge="1">
+                  <a:txBody>
+                    <a:bodyPr/>
+                    <a:lstStyle/>
+                    <a:p>
+                      <a:endParaRPr lang="en-GB"/>
+                    </a:p>
+                  </a:txBody>
+                  <a:tcPr/>
+                </a:tc>
+                <a:tc gridSpan="2">
+                  <a:txBody>
+                    <a:bodyPr/>
+                    <a:lstStyle/>
+                    <a:p>
+                      <a:pPr algn="ctr"/>
+                      <a:r>
+                        <a:rPr lang="nb-NO" dirty="0"/>
+                        <a:t>Real </a:t>
+                      </a:r>
+                      <a:r>
+                        <a:rPr lang="nb-NO" dirty="0" err="1"/>
+                        <a:t>dataset</a:t>
+                      </a:r>
+                      <a:r>
+                        <a:rPr lang="nb-NO" dirty="0"/>
+                        <a:t> [TNW]</a:t>
+                      </a:r>
+                      <a:endParaRPr lang="en-GB" dirty="0"/>
+                    </a:p>
+                  </a:txBody>
+                  <a:tcPr anchor="ctr"/>
+                </a:tc>
+                <a:tc hMerge="1">
+                  <a:txBody>
+                    <a:bodyPr/>
+                    <a:lstStyle/>
+                    <a:p>
+                      <a:endParaRPr lang="en-GB"/>
+                    </a:p>
+                  </a:txBody>
+                  <a:tcPr/>
+                </a:tc>
+                <a:extLst>
+                  <a:ext uri="{0D108BD9-81ED-4DB2-BD59-A6C34878D82A}">
+                    <a16:rowId xmlns:a16="http://schemas.microsoft.com/office/drawing/2014/main" val="3665617611"/>
+                  </a:ext>
+                </a:extLst>
+              </a:tr>
+              <a:tr h="565660">
+                <a:tc rowSpan="2">
+                  <a:txBody>
+                    <a:bodyPr/>
+                    <a:lstStyle/>
+                    <a:p>
+                      <a:pPr algn="ctr"/>
+                      <a:r>
+                        <a:rPr lang="nb-NO" dirty="0" err="1"/>
+                        <a:t>Adversarial</a:t>
+                      </a:r>
+                      <a:r>
+                        <a:rPr lang="nb-NO" dirty="0"/>
+                        <a:t> Training</a:t>
+                      </a:r>
+                      <a:endParaRPr lang="en-GB" dirty="0"/>
+                    </a:p>
+                  </a:txBody>
+                  <a:tcPr anchor="ctr"/>
+                </a:tc>
+                <a:tc gridSpan="2">
+                  <a:txBody>
+                    <a:bodyPr/>
+                    <a:lstStyle/>
+                    <a:p>
+                      <a:pPr algn="ctr"/>
+                      <a:r>
+                        <a:rPr lang="nb-NO" dirty="0"/>
+                        <a:t>Variable </a:t>
+                      </a:r>
+                      <a:r>
+                        <a:rPr lang="nb-NO" dirty="0" err="1"/>
+                        <a:t>Autoencoding</a:t>
+                      </a:r>
+                      <a:endParaRPr lang="en-GB" dirty="0"/>
+                    </a:p>
+                  </a:txBody>
+                  <a:tcPr anchor="ctr"/>
+                </a:tc>
+                <a:tc hMerge="1">
+                  <a:txBody>
+                    <a:bodyPr/>
+                    <a:lstStyle/>
+                    <a:p>
+                      <a:endParaRPr lang="en-GB"/>
+                    </a:p>
+                  </a:txBody>
+                  <a:tcPr/>
+                </a:tc>
+                <a:tc gridSpan="2">
+                  <a:txBody>
+                    <a:bodyPr/>
+                    <a:lstStyle/>
+                    <a:p>
+                      <a:pPr algn="ctr"/>
+                      <a:r>
+                        <a:rPr lang="nb-NO" dirty="0"/>
+                        <a:t>Variable </a:t>
+                      </a:r>
+                      <a:r>
+                        <a:rPr lang="nb-NO" dirty="0" err="1"/>
+                        <a:t>Autoencoding</a:t>
+                      </a:r>
+                      <a:endParaRPr lang="en-GB" dirty="0"/>
+                    </a:p>
+                  </a:txBody>
+                  <a:tcPr anchor="ctr"/>
+                </a:tc>
+                <a:tc hMerge="1">
+                  <a:txBody>
+                    <a:bodyPr/>
+                    <a:lstStyle/>
+                    <a:p>
+                      <a:endParaRPr lang="en-GB"/>
+                    </a:p>
+                  </a:txBody>
+                  <a:tcPr/>
+                </a:tc>
+                <a:extLst>
+                  <a:ext uri="{0D108BD9-81ED-4DB2-BD59-A6C34878D82A}">
+                    <a16:rowId xmlns:a16="http://schemas.microsoft.com/office/drawing/2014/main" val="288445265"/>
+                  </a:ext>
+                </a:extLst>
+              </a:tr>
+              <a:tr h="565660">
+                <a:tc vMerge="1">
+                  <a:txBody>
+                    <a:bodyPr/>
+                    <a:lstStyle/>
+                    <a:p>
+                      <a:endParaRPr lang="en-GB"/>
+                    </a:p>
+                  </a:txBody>
+                  <a:tcPr/>
+                </a:tc>
+                <a:tc>
+                  <a:txBody>
+                    <a:bodyPr/>
+                    <a:lstStyle/>
+                    <a:p>
+                      <a:pPr algn="ctr"/>
+                      <a:r>
+                        <a:rPr lang="nb-NO" dirty="0" err="1"/>
+                        <a:t>Yes</a:t>
+                      </a:r>
+                      <a:endParaRPr lang="en-GB" dirty="0"/>
+                    </a:p>
+                  </a:txBody>
+                  <a:tcPr anchor="ctr"/>
+                </a:tc>
+                <a:tc>
+                  <a:txBody>
+                    <a:bodyPr/>
+                    <a:lstStyle/>
+                    <a:p>
+                      <a:pPr algn="ctr"/>
+                      <a:r>
+                        <a:rPr lang="nb-NO" dirty="0"/>
+                        <a:t>No</a:t>
+                      </a:r>
+                      <a:endParaRPr lang="en-GB" dirty="0"/>
+                    </a:p>
+                  </a:txBody>
+                  <a:tcPr anchor="ctr"/>
+                </a:tc>
+                <a:tc>
+                  <a:txBody>
+                    <a:bodyPr/>
+                    <a:lstStyle/>
+                    <a:p>
+                      <a:pPr algn="ctr"/>
+                      <a:r>
+                        <a:rPr lang="nb-NO" dirty="0" err="1"/>
+                        <a:t>Yes</a:t>
+                      </a:r>
+                      <a:endParaRPr lang="en-GB" dirty="0"/>
+                    </a:p>
+                  </a:txBody>
+                  <a:tcPr anchor="ctr"/>
+                </a:tc>
+                <a:tc>
+                  <a:txBody>
+                    <a:bodyPr/>
+                    <a:lstStyle/>
+                    <a:p>
+                      <a:pPr algn="ctr"/>
+                      <a:r>
+                        <a:rPr lang="nb-NO" dirty="0"/>
+                        <a:t>No</a:t>
+                      </a:r>
+                      <a:endParaRPr lang="en-GB" dirty="0"/>
+                    </a:p>
+                  </a:txBody>
+                  <a:tcPr anchor="ctr"/>
+                </a:tc>
+                <a:extLst>
+                  <a:ext uri="{0D108BD9-81ED-4DB2-BD59-A6C34878D82A}">
+                    <a16:rowId xmlns:a16="http://schemas.microsoft.com/office/drawing/2014/main" val="1349701035"/>
+                  </a:ext>
+                </a:extLst>
+              </a:tr>
+              <a:tr h="573517">
+                <a:tc>
+                  <a:txBody>
+                    <a:bodyPr/>
+                    <a:lstStyle/>
+                    <a:p>
+                      <a:pPr algn="ctr"/>
+                      <a:r>
+                        <a:rPr lang="nb-NO" dirty="0"/>
+                        <a:t>2D</a:t>
+                      </a:r>
+                      <a:endParaRPr lang="en-GB" dirty="0"/>
+                    </a:p>
+                  </a:txBody>
+                  <a:tcPr anchor="ctr"/>
+                </a:tc>
+                <a:tc>
+                  <a:txBody>
+                    <a:bodyPr/>
+                    <a:lstStyle/>
+                    <a:p>
+                      <a:pPr algn="ctr"/>
+                      <a:r>
+                        <a:rPr lang="nb-NO" dirty="0" err="1"/>
+                        <a:t>Yes</a:t>
+                      </a:r>
+                      <a:endParaRPr lang="en-GB" dirty="0"/>
+                    </a:p>
+                  </a:txBody>
+                  <a:tcPr anchor="ctr"/>
+                </a:tc>
+                <a:tc>
+                  <a:txBody>
+                    <a:bodyPr/>
+                    <a:lstStyle/>
+                    <a:p>
+                      <a:pPr algn="ctr"/>
+                      <a:r>
+                        <a:rPr lang="nb-NO" dirty="0"/>
+                        <a:t>No</a:t>
+                      </a:r>
+                      <a:endParaRPr lang="en-GB" dirty="0"/>
+                    </a:p>
+                  </a:txBody>
+                  <a:tcPr anchor="ctr"/>
+                </a:tc>
+                <a:tc>
+                  <a:txBody>
+                    <a:bodyPr/>
+                    <a:lstStyle/>
+                    <a:p>
+                      <a:pPr algn="ctr"/>
+                      <a:r>
+                        <a:rPr lang="nb-NO" dirty="0" err="1"/>
+                        <a:t>Yes</a:t>
+                      </a:r>
+                      <a:endParaRPr lang="en-GB" dirty="0"/>
+                    </a:p>
+                  </a:txBody>
+                  <a:tcPr anchor="ctr"/>
+                </a:tc>
+                <a:tc>
+                  <a:txBody>
+                    <a:bodyPr/>
+                    <a:lstStyle/>
+                    <a:p>
+                      <a:pPr algn="ctr"/>
+                      <a:r>
+                        <a:rPr lang="nb-NO" dirty="0"/>
+                        <a:t>No</a:t>
+                      </a:r>
+                      <a:endParaRPr lang="en-GB" dirty="0"/>
+                    </a:p>
+                  </a:txBody>
+                  <a:tcPr anchor="ctr"/>
+                </a:tc>
+                <a:extLst>
+                  <a:ext uri="{0D108BD9-81ED-4DB2-BD59-A6C34878D82A}">
+                    <a16:rowId xmlns:a16="http://schemas.microsoft.com/office/drawing/2014/main" val="729098689"/>
+                  </a:ext>
+                </a:extLst>
+              </a:tr>
+            </a:tbl>
+          </a:graphicData>
+        </a:graphic>
+      </p:graphicFrame>
+    </p:spTree>
+    <p:extLst>
+      <p:ext uri="{BB962C8B-B14F-4D97-AF65-F5344CB8AC3E}">
+        <p14:creationId xmlns:p14="http://schemas.microsoft.com/office/powerpoint/2010/main" val="1233532157"/>
+      </p:ext>
+    </p:extLst>
+  </p:cSld>
+  <p:clrMapOvr>
+    <a:masterClrMapping/>
+  </p:clrMapOvr>
+</p:sld>
+</file>
+
+<file path=ppt/slides/slide11.xml><?xml version="1.0" encoding="utf-8"?>
+<p:sld xmlns:a="http://schemas.openxmlformats.org/drawingml/2006/main" xmlns:r="http://schemas.openxmlformats.org/officeDocument/2006/relationships" xmlns:p="http://schemas.openxmlformats.org/presentationml/2006/main">
+  <p:cSld>
+    <p:spTree>
+      <p:nvGrpSpPr>
+        <p:cNvPr id="1" name=""/>
+        <p:cNvGrpSpPr/>
+        <p:nvPr/>
+      </p:nvGrpSpPr>
+      <p:grpSpPr>
+        <a:xfrm>
+          <a:off x="0" y="0"/>
+          <a:ext cx="0" cy="0"/>
+          <a:chOff x="0" y="0"/>
+          <a:chExt cx="0" cy="0"/>
+        </a:xfrm>
+      </p:grpSpPr>
+      <p:sp>
+        <p:nvSpPr>
+          <p:cNvPr id="2" name="Title 1">
+            <a:extLst>
+              <a:ext uri="{FF2B5EF4-FFF2-40B4-BE49-F238E27FC236}">
+                <a16:creationId xmlns:a16="http://schemas.microsoft.com/office/drawing/2014/main" id="{92C0EC3A-11DB-4107-AA5F-293F6AE04682}"/>
+              </a:ext>
+            </a:extLst>
+          </p:cNvPr>
+          <p:cNvSpPr>
+            <a:spLocks noGrp="1"/>
+          </p:cNvSpPr>
+          <p:nvPr>
+            <p:ph type="title"/>
+          </p:nvPr>
+        </p:nvSpPr>
+        <p:spPr/>
+        <p:txBody>
+          <a:bodyPr/>
+          <a:lstStyle/>
+          <a:p>
+            <a:r>
+              <a:rPr lang="nb-NO" dirty="0" err="1"/>
+              <a:t>writing</a:t>
+            </a:r>
+            <a:endParaRPr lang="en-GB" dirty="0"/>
+          </a:p>
+        </p:txBody>
+      </p:sp>
+      <p:sp>
+        <p:nvSpPr>
+          <p:cNvPr id="3" name="Content Placeholder 2">
+            <a:extLst>
+              <a:ext uri="{FF2B5EF4-FFF2-40B4-BE49-F238E27FC236}">
+                <a16:creationId xmlns:a16="http://schemas.microsoft.com/office/drawing/2014/main" id="{2110F2EF-2002-4B69-9B30-755335B94858}"/>
+              </a:ext>
+            </a:extLst>
+          </p:cNvPr>
+          <p:cNvSpPr>
+            <a:spLocks noGrp="1"/>
+          </p:cNvSpPr>
+          <p:nvPr>
+            <p:ph idx="1"/>
+          </p:nvPr>
+        </p:nvSpPr>
+        <p:spPr/>
+        <p:txBody>
+          <a:bodyPr/>
+          <a:lstStyle/>
+          <a:p>
+            <a:r>
+              <a:rPr lang="nb-NO" dirty="0"/>
+              <a:t>For ML </a:t>
+            </a:r>
+            <a:r>
+              <a:rPr lang="nb-NO" dirty="0" err="1"/>
+              <a:t>I’m</a:t>
+            </a:r>
+            <a:r>
+              <a:rPr lang="nb-NO" dirty="0"/>
+              <a:t> </a:t>
+            </a:r>
+            <a:r>
+              <a:rPr lang="nb-NO" dirty="0" err="1"/>
+              <a:t>using</a:t>
+            </a:r>
+            <a:r>
+              <a:rPr lang="nb-NO" dirty="0"/>
+              <a:t> Tom </a:t>
+            </a:r>
+            <a:r>
+              <a:rPr lang="nb-NO" dirty="0" err="1"/>
+              <a:t>Mitchell’s</a:t>
+            </a:r>
+            <a:r>
+              <a:rPr lang="nb-NO" dirty="0"/>
+              <a:t> book «Machine Learning»</a:t>
+            </a:r>
+          </a:p>
+          <a:p>
+            <a:r>
+              <a:rPr lang="nb-NO" dirty="0" err="1"/>
+              <a:t>Also</a:t>
+            </a:r>
+            <a:r>
+              <a:rPr lang="nb-NO" dirty="0"/>
+              <a:t> </a:t>
+            </a:r>
+            <a:r>
+              <a:rPr lang="nb-NO" dirty="0" err="1"/>
+              <a:t>other</a:t>
+            </a:r>
+            <a:r>
+              <a:rPr lang="nb-NO" dirty="0"/>
+              <a:t> </a:t>
+            </a:r>
+            <a:r>
+              <a:rPr lang="nb-NO" dirty="0" err="1"/>
+              <a:t>sources</a:t>
+            </a:r>
+            <a:r>
+              <a:rPr lang="nb-NO" dirty="0"/>
+              <a:t> from </a:t>
+            </a:r>
+            <a:r>
+              <a:rPr lang="nb-NO" dirty="0" err="1"/>
+              <a:t>papers</a:t>
+            </a:r>
+            <a:r>
+              <a:rPr lang="nb-NO"/>
+              <a:t>.</a:t>
+            </a:r>
+            <a:endParaRPr lang="en-GB"/>
+          </a:p>
+        </p:txBody>
+      </p:sp>
+    </p:spTree>
+    <p:extLst>
+      <p:ext uri="{BB962C8B-B14F-4D97-AF65-F5344CB8AC3E}">
+        <p14:creationId xmlns:p14="http://schemas.microsoft.com/office/powerpoint/2010/main" val="3753794754"/>
+      </p:ext>
+    </p:extLst>
+  </p:cSld>
+  <p:clrMapOvr>
+    <a:masterClrMapping/>
+  </p:clrMapOvr>
+</p:sld>
+</file>
+
 <file path=ppt/slides/slide2.xml><?xml version="1.0" encoding="utf-8"?>
 <p:sld xmlns:a="http://schemas.openxmlformats.org/drawingml/2006/main" xmlns:r="http://schemas.openxmlformats.org/officeDocument/2006/relationships" xmlns:p="http://schemas.openxmlformats.org/presentationml/2006/main">
   <p:cSld>
@@ -4309,34 +4927,178 @@
           <a:chExt cx="0" cy="0"/>
         </a:xfrm>
       </p:grpSpPr>
-      <p:sp>
-        <p:nvSpPr>
-          <p:cNvPr id="2" name="Title 1">
-            <a:extLst>
-              <a:ext uri="{FF2B5EF4-FFF2-40B4-BE49-F238E27FC236}">
-                <a16:creationId xmlns:a16="http://schemas.microsoft.com/office/drawing/2014/main" id="{E1CCD4A3-359E-40AD-9C21-EBB01BB14A8B}"/>
-              </a:ext>
-            </a:extLst>
-          </p:cNvPr>
-          <p:cNvSpPr>
-            <a:spLocks noGrp="1"/>
-          </p:cNvSpPr>
-          <p:nvPr>
-            <p:ph type="title"/>
-          </p:nvPr>
-        </p:nvSpPr>
-        <p:spPr/>
-        <p:txBody>
-          <a:bodyPr/>
-          <a:lstStyle/>
-          <a:p>
-            <a:r>
-              <a:rPr lang="nb-NO" dirty="0"/>
-              <a:t>Open </a:t>
-            </a:r>
+      <p:pic>
+        <p:nvPicPr>
+          <p:cNvPr id="1026" name="Picture 2">
+            <a:extLst>
+              <a:ext uri="{FF2B5EF4-FFF2-40B4-BE49-F238E27FC236}">
+                <a16:creationId xmlns:a16="http://schemas.microsoft.com/office/drawing/2014/main" id="{05942BDB-FB12-4BDD-A0B1-B6371EDE3392}"/>
+              </a:ext>
+            </a:extLst>
+          </p:cNvPr>
+          <p:cNvPicPr>
+            <a:picLocks noChangeAspect="1" noChangeArrowheads="1"/>
+          </p:cNvPicPr>
+          <p:nvPr/>
+        </p:nvPicPr>
+        <p:blipFill>
+          <a:blip r:embed="rId2">
+            <a:extLst>
+              <a:ext uri="{28A0092B-C50C-407E-A947-70E740481C1C}">
+                <a14:useLocalDpi xmlns:a14="http://schemas.microsoft.com/office/drawing/2010/main" val="0"/>
+              </a:ext>
+            </a:extLst>
+          </a:blip>
+          <a:srcRect/>
+          <a:stretch>
+            <a:fillRect/>
+          </a:stretch>
+        </p:blipFill>
+        <p:spPr bwMode="auto">
+          <a:xfrm>
+            <a:off x="6409814" y="4063498"/>
+            <a:ext cx="4898805" cy="1965901"/>
+          </a:xfrm>
+          <a:prstGeom prst="rect">
+            <a:avLst/>
+          </a:prstGeom>
+          <a:noFill/>
+          <a:extLst>
+            <a:ext uri="{909E8E84-426E-40DD-AFC4-6F175D3DCCD1}">
+              <a14:hiddenFill xmlns:a14="http://schemas.microsoft.com/office/drawing/2010/main">
+                <a:solidFill>
+                  <a:srgbClr val="FFFFFF"/>
+                </a:solidFill>
+              </a14:hiddenFill>
+            </a:ext>
+          </a:extLst>
+        </p:spPr>
+      </p:pic>
+      <p:pic>
+        <p:nvPicPr>
+          <p:cNvPr id="1028" name="Picture 4">
+            <a:extLst>
+              <a:ext uri="{FF2B5EF4-FFF2-40B4-BE49-F238E27FC236}">
+                <a16:creationId xmlns:a16="http://schemas.microsoft.com/office/drawing/2014/main" id="{5AE7BE2D-C866-4860-81C6-BB23FB22DF29}"/>
+              </a:ext>
+            </a:extLst>
+          </p:cNvPr>
+          <p:cNvPicPr>
+            <a:picLocks noChangeAspect="1" noChangeArrowheads="1"/>
+          </p:cNvPicPr>
+          <p:nvPr/>
+        </p:nvPicPr>
+        <p:blipFill>
+          <a:blip r:embed="rId3">
+            <a:extLst>
+              <a:ext uri="{28A0092B-C50C-407E-A947-70E740481C1C}">
+                <a14:useLocalDpi xmlns:a14="http://schemas.microsoft.com/office/drawing/2010/main" val="0"/>
+              </a:ext>
+            </a:extLst>
+          </a:blip>
+          <a:srcRect/>
+          <a:stretch>
+            <a:fillRect/>
+          </a:stretch>
+        </p:blipFill>
+        <p:spPr bwMode="auto">
+          <a:xfrm>
+            <a:off x="6976187" y="2097598"/>
+            <a:ext cx="3766057" cy="1965901"/>
+          </a:xfrm>
+          <a:prstGeom prst="rect">
+            <a:avLst/>
+          </a:prstGeom>
+          <a:noFill/>
+          <a:extLst>
+            <a:ext uri="{909E8E84-426E-40DD-AFC4-6F175D3DCCD1}">
+              <a14:hiddenFill xmlns:a14="http://schemas.microsoft.com/office/drawing/2010/main">
+                <a:solidFill>
+                  <a:srgbClr val="FFFFFF"/>
+                </a:solidFill>
+              </a14:hiddenFill>
+            </a:ext>
+          </a:extLst>
+        </p:spPr>
+      </p:pic>
+      <p:pic>
+        <p:nvPicPr>
+          <p:cNvPr id="1030" name="Picture 6">
+            <a:extLst>
+              <a:ext uri="{FF2B5EF4-FFF2-40B4-BE49-F238E27FC236}">
+                <a16:creationId xmlns:a16="http://schemas.microsoft.com/office/drawing/2014/main" id="{668CF9D3-4CEC-48F2-B1AD-90B4A82C7383}"/>
+              </a:ext>
+            </a:extLst>
+          </p:cNvPr>
+          <p:cNvPicPr>
+            <a:picLocks noChangeAspect="1" noChangeArrowheads="1"/>
+          </p:cNvPicPr>
+          <p:nvPr/>
+        </p:nvPicPr>
+        <p:blipFill>
+          <a:blip r:embed="rId4">
+            <a:extLst>
+              <a:ext uri="{28A0092B-C50C-407E-A947-70E740481C1C}">
+                <a14:useLocalDpi xmlns:a14="http://schemas.microsoft.com/office/drawing/2010/main" val="0"/>
+              </a:ext>
+            </a:extLst>
+          </a:blip>
+          <a:srcRect/>
+          <a:stretch>
+            <a:fillRect/>
+          </a:stretch>
+        </p:blipFill>
+        <p:spPr bwMode="auto">
+          <a:xfrm>
+            <a:off x="6488351" y="74010"/>
+            <a:ext cx="4459443" cy="2023588"/>
+          </a:xfrm>
+          <a:prstGeom prst="rect">
+            <a:avLst/>
+          </a:prstGeom>
+          <a:noFill/>
+          <a:extLst>
+            <a:ext uri="{909E8E84-426E-40DD-AFC4-6F175D3DCCD1}">
+              <a14:hiddenFill xmlns:a14="http://schemas.microsoft.com/office/drawing/2010/main">
+                <a:solidFill>
+                  <a:srgbClr val="FFFFFF"/>
+                </a:solidFill>
+              </a14:hiddenFill>
+            </a:ext>
+          </a:extLst>
+        </p:spPr>
+      </p:pic>
+      <p:sp>
+        <p:nvSpPr>
+          <p:cNvPr id="4" name="TextBox 3">
+            <a:extLst>
+              <a:ext uri="{FF2B5EF4-FFF2-40B4-BE49-F238E27FC236}">
+                <a16:creationId xmlns:a16="http://schemas.microsoft.com/office/drawing/2014/main" id="{4041398A-96B0-4B4E-98F8-4E9F47A627B1}"/>
+              </a:ext>
+            </a:extLst>
+          </p:cNvPr>
+          <p:cNvSpPr txBox="1"/>
+          <p:nvPr/>
+        </p:nvSpPr>
+        <p:spPr>
+          <a:xfrm>
+            <a:off x="1044102" y="929218"/>
+            <a:ext cx="4659549" cy="646331"/>
+          </a:xfrm>
+          <a:prstGeom prst="rect">
+            <a:avLst/>
+          </a:prstGeom>
+          <a:noFill/>
+        </p:spPr>
+        <p:txBody>
+          <a:bodyPr wrap="square" rtlCol="0">
+            <a:spAutoFit/>
+          </a:bodyPr>
+          <a:lstStyle/>
+          <a:p>
             <a:r>
               <a:rPr lang="nb-NO" dirty="0" err="1"/>
-              <a:t>source</a:t>
+              <a:t>Reflectivity</a:t>
             </a:r>
             <a:r>
               <a:rPr lang="nb-NO" dirty="0"/>
@@ -4344,151 +5106,48 @@
             </a:r>
             <a:r>
               <a:rPr lang="nb-NO" dirty="0" err="1"/>
-              <a:t>datasets</a:t>
-            </a:r>
-            <a:endParaRPr lang="en-GB" dirty="0"/>
-          </a:p>
-        </p:txBody>
-      </p:sp>
-      <p:sp>
-        <p:nvSpPr>
-          <p:cNvPr id="3" name="Content Placeholder 2">
-            <a:extLst>
-              <a:ext uri="{FF2B5EF4-FFF2-40B4-BE49-F238E27FC236}">
-                <a16:creationId xmlns:a16="http://schemas.microsoft.com/office/drawing/2014/main" id="{61B39D77-B53C-44ED-B7EA-4FCFE62CD7C5}"/>
-              </a:ext>
-            </a:extLst>
-          </p:cNvPr>
-          <p:cNvSpPr>
-            <a:spLocks noGrp="1"/>
-          </p:cNvSpPr>
-          <p:nvPr>
-            <p:ph idx="1"/>
-          </p:nvPr>
-        </p:nvSpPr>
-        <p:spPr/>
-        <p:txBody>
-          <a:bodyPr/>
-          <a:lstStyle/>
-          <a:p>
+              <a:t>generally</a:t>
+            </a:r>
             <a:r>
               <a:rPr lang="nb-NO" dirty="0"/>
-              <a:t>SEAM </a:t>
+              <a:t> matches </a:t>
+            </a:r>
+            <a:r>
+              <a:rPr lang="nb-NO" dirty="0" err="1"/>
+              <a:t>badly</a:t>
+            </a:r>
+            <a:r>
+              <a:rPr lang="nb-NO" dirty="0"/>
+              <a:t> </a:t>
+            </a:r>
+            <a:r>
+              <a:rPr lang="nb-NO" dirty="0" err="1"/>
+              <a:t>with</a:t>
+            </a:r>
+            <a:r>
+              <a:rPr lang="nb-NO" dirty="0"/>
+              <a:t> </a:t>
+            </a:r>
+            <a:r>
+              <a:rPr lang="nb-NO" dirty="0" err="1"/>
+              <a:t>the</a:t>
+            </a:r>
+            <a:r>
+              <a:rPr lang="nb-NO" dirty="0"/>
+              <a:t> traces in </a:t>
+            </a:r>
+            <a:r>
+              <a:rPr lang="nb-NO" dirty="0" err="1"/>
+              <a:t>the</a:t>
+            </a:r>
+            <a:r>
+              <a:rPr lang="nb-NO" dirty="0"/>
+              <a:t> TNW </a:t>
             </a:r>
             <a:r>
               <a:rPr lang="nb-NO" dirty="0" err="1"/>
               <a:t>dataset</a:t>
             </a:r>
-            <a:endParaRPr lang="nb-NO" dirty="0"/>
-          </a:p>
-          <a:p>
-            <a:pPr lvl="1"/>
-            <a:r>
-              <a:rPr lang="nb-NO" dirty="0"/>
-              <a:t>Used for </a:t>
-            </a:r>
-            <a:r>
-              <a:rPr lang="nb-NO" dirty="0" err="1"/>
-              <a:t>modeling</a:t>
-            </a:r>
-            <a:r>
-              <a:rPr lang="nb-NO" dirty="0"/>
-              <a:t> salt body petroleum </a:t>
-            </a:r>
-            <a:r>
-              <a:rPr lang="nb-NO" dirty="0" err="1"/>
-              <a:t>reservoirs</a:t>
-            </a:r>
-            <a:endParaRPr lang="nb-NO" dirty="0"/>
-          </a:p>
-          <a:p>
-            <a:r>
-              <a:rPr lang="nb-NO" dirty="0"/>
-              <a:t>Will have to </a:t>
-            </a:r>
-            <a:r>
-              <a:rPr lang="nb-NO" dirty="0" err="1"/>
-              <a:t>model</a:t>
-            </a:r>
-            <a:r>
-              <a:rPr lang="nb-NO" dirty="0"/>
-              <a:t> </a:t>
-            </a:r>
-            <a:r>
-              <a:rPr lang="nb-NO" dirty="0" err="1"/>
-              <a:t>the</a:t>
-            </a:r>
-            <a:r>
-              <a:rPr lang="nb-NO" dirty="0"/>
-              <a:t> </a:t>
-            </a:r>
-            <a:r>
-              <a:rPr lang="nb-NO" dirty="0" err="1"/>
-              <a:t>seismic</a:t>
-            </a:r>
-            <a:r>
-              <a:rPr lang="nb-NO" dirty="0"/>
-              <a:t>..</a:t>
-            </a:r>
-          </a:p>
-          <a:p>
-            <a:pPr lvl="1"/>
-            <a:r>
-              <a:rPr lang="nb-NO" dirty="0"/>
-              <a:t>Just </a:t>
-            </a:r>
-            <a:r>
-              <a:rPr lang="nb-NO" dirty="0" err="1"/>
-              <a:t>convolve</a:t>
-            </a:r>
-            <a:r>
-              <a:rPr lang="nb-NO" dirty="0"/>
-              <a:t> </a:t>
-            </a:r>
-            <a:r>
-              <a:rPr lang="nb-NO" dirty="0" err="1"/>
-              <a:t>the</a:t>
-            </a:r>
-            <a:r>
-              <a:rPr lang="nb-NO" dirty="0"/>
-              <a:t> </a:t>
-            </a:r>
-            <a:r>
-              <a:rPr lang="nb-NO" dirty="0" err="1"/>
-              <a:t>wavelet</a:t>
-            </a:r>
-            <a:r>
-              <a:rPr lang="nb-NO" dirty="0"/>
-              <a:t>?</a:t>
-            </a:r>
-          </a:p>
-          <a:p>
-            <a:pPr lvl="1"/>
-            <a:r>
-              <a:rPr lang="nb-NO" dirty="0"/>
-              <a:t>More </a:t>
-            </a:r>
-            <a:r>
-              <a:rPr lang="nb-NO" dirty="0" err="1"/>
-              <a:t>sophisticated</a:t>
-            </a:r>
-            <a:r>
-              <a:rPr lang="nb-NO" dirty="0"/>
-              <a:t> </a:t>
-            </a:r>
-            <a:r>
-              <a:rPr lang="nb-NO" dirty="0" err="1"/>
-              <a:t>modeling</a:t>
-            </a:r>
-            <a:r>
-              <a:rPr lang="nb-NO" dirty="0"/>
-              <a:t>?</a:t>
-            </a:r>
-          </a:p>
-          <a:p>
-            <a:pPr marL="0" indent="0">
-              <a:buNone/>
-            </a:pPr>
             <a:endParaRPr lang="en-GB" dirty="0"/>
           </a:p>
         </p:txBody>
@@ -4496,7 +5155,7 @@
     </p:spTree>
     <p:extLst>
       <p:ext uri="{BB962C8B-B14F-4D97-AF65-F5344CB8AC3E}">
-        <p14:creationId xmlns:p14="http://schemas.microsoft.com/office/powerpoint/2010/main" val="3208627913"/>
+        <p14:creationId xmlns:p14="http://schemas.microsoft.com/office/powerpoint/2010/main" val="3018917051"/>
       </p:ext>
     </p:extLst>
   </p:cSld>
@@ -4523,46 +5182,213 @@
           <a:chExt cx="0" cy="0"/>
         </a:xfrm>
       </p:grpSpPr>
-      <p:pic>
-        <p:nvPicPr>
-          <p:cNvPr id="5" name="Picture 4" descr="Chart&#10;&#10;Description automatically generated">
-            <a:extLst>
-              <a:ext uri="{FF2B5EF4-FFF2-40B4-BE49-F238E27FC236}">
-                <a16:creationId xmlns:a16="http://schemas.microsoft.com/office/drawing/2014/main" id="{8A2A78F7-683A-135D-FB1E-295828AB89FF}"/>
-              </a:ext>
-            </a:extLst>
-          </p:cNvPr>
-          <p:cNvPicPr>
-            <a:picLocks noChangeAspect="1"/>
-          </p:cNvPicPr>
-          <p:nvPr/>
-        </p:nvPicPr>
-        <p:blipFill>
-          <a:blip r:embed="rId2">
-            <a:extLst>
-              <a:ext uri="{28A0092B-C50C-407E-A947-70E740481C1C}">
-                <a14:useLocalDpi xmlns:a14="http://schemas.microsoft.com/office/drawing/2010/main" val="0"/>
-              </a:ext>
-            </a:extLst>
-          </a:blip>
-          <a:stretch>
-            <a:fillRect/>
-          </a:stretch>
-        </p:blipFill>
-        <p:spPr>
-          <a:xfrm>
-            <a:off x="1238250" y="0"/>
-            <a:ext cx="9477375" cy="6384648"/>
-          </a:xfrm>
-          <a:prstGeom prst="rect">
-            <a:avLst/>
-          </a:prstGeom>
-        </p:spPr>
-      </p:pic>
+      <p:sp>
+        <p:nvSpPr>
+          <p:cNvPr id="2" name="Title 1">
+            <a:extLst>
+              <a:ext uri="{FF2B5EF4-FFF2-40B4-BE49-F238E27FC236}">
+                <a16:creationId xmlns:a16="http://schemas.microsoft.com/office/drawing/2014/main" id="{E1CCD4A3-359E-40AD-9C21-EBB01BB14A8B}"/>
+              </a:ext>
+            </a:extLst>
+          </p:cNvPr>
+          <p:cNvSpPr>
+            <a:spLocks noGrp="1"/>
+          </p:cNvSpPr>
+          <p:nvPr>
+            <p:ph type="title"/>
+          </p:nvPr>
+        </p:nvSpPr>
+        <p:spPr/>
+        <p:txBody>
+          <a:bodyPr/>
+          <a:lstStyle/>
+          <a:p>
+            <a:r>
+              <a:rPr lang="nb-NO" dirty="0"/>
+              <a:t>Open </a:t>
+            </a:r>
+            <a:r>
+              <a:rPr lang="nb-NO" dirty="0" err="1"/>
+              <a:t>source</a:t>
+            </a:r>
+            <a:r>
+              <a:rPr lang="nb-NO" dirty="0"/>
+              <a:t> </a:t>
+            </a:r>
+            <a:r>
+              <a:rPr lang="nb-NO" dirty="0" err="1"/>
+              <a:t>datasets</a:t>
+            </a:r>
+            <a:endParaRPr lang="en-GB" dirty="0"/>
+          </a:p>
+        </p:txBody>
+      </p:sp>
+      <p:sp>
+        <p:nvSpPr>
+          <p:cNvPr id="3" name="Content Placeholder 2">
+            <a:extLst>
+              <a:ext uri="{FF2B5EF4-FFF2-40B4-BE49-F238E27FC236}">
+                <a16:creationId xmlns:a16="http://schemas.microsoft.com/office/drawing/2014/main" id="{61B39D77-B53C-44ED-B7EA-4FCFE62CD7C5}"/>
+              </a:ext>
+            </a:extLst>
+          </p:cNvPr>
+          <p:cNvSpPr>
+            <a:spLocks noGrp="1"/>
+          </p:cNvSpPr>
+          <p:nvPr>
+            <p:ph idx="1"/>
+          </p:nvPr>
+        </p:nvSpPr>
+        <p:spPr/>
+        <p:txBody>
+          <a:bodyPr/>
+          <a:lstStyle/>
+          <a:p>
+            <a:r>
+              <a:rPr lang="nb-NO" dirty="0"/>
+              <a:t>SEAM </a:t>
+            </a:r>
+            <a:r>
+              <a:rPr lang="nb-NO" dirty="0" err="1"/>
+              <a:t>dataset</a:t>
+            </a:r>
+            <a:endParaRPr lang="nb-NO" dirty="0"/>
+          </a:p>
+          <a:p>
+            <a:pPr lvl="1"/>
+            <a:r>
+              <a:rPr lang="nb-NO" dirty="0"/>
+              <a:t>Used for </a:t>
+            </a:r>
+            <a:r>
+              <a:rPr lang="nb-NO" dirty="0" err="1"/>
+              <a:t>modeling</a:t>
+            </a:r>
+            <a:r>
+              <a:rPr lang="nb-NO" dirty="0"/>
+              <a:t> salt body petroleum </a:t>
+            </a:r>
+            <a:r>
+              <a:rPr lang="nb-NO" dirty="0" err="1"/>
+              <a:t>reservoirs</a:t>
+            </a:r>
+            <a:endParaRPr lang="nb-NO" dirty="0"/>
+          </a:p>
+          <a:p>
+            <a:r>
+              <a:rPr lang="nb-NO" dirty="0"/>
+              <a:t>Will have to </a:t>
+            </a:r>
+            <a:r>
+              <a:rPr lang="nb-NO" dirty="0" err="1"/>
+              <a:t>model</a:t>
+            </a:r>
+            <a:r>
+              <a:rPr lang="nb-NO" dirty="0"/>
+              <a:t> </a:t>
+            </a:r>
+            <a:r>
+              <a:rPr lang="nb-NO" dirty="0" err="1"/>
+              <a:t>the</a:t>
+            </a:r>
+            <a:r>
+              <a:rPr lang="nb-NO" dirty="0"/>
+              <a:t> </a:t>
+            </a:r>
+            <a:r>
+              <a:rPr lang="nb-NO" dirty="0" err="1"/>
+              <a:t>seismic</a:t>
+            </a:r>
+            <a:r>
+              <a:rPr lang="nb-NO" dirty="0"/>
+              <a:t>..</a:t>
+            </a:r>
+          </a:p>
+          <a:p>
+            <a:pPr lvl="1"/>
+            <a:r>
+              <a:rPr lang="nb-NO" dirty="0"/>
+              <a:t>Just </a:t>
+            </a:r>
+            <a:r>
+              <a:rPr lang="nb-NO" dirty="0" err="1"/>
+              <a:t>convolve</a:t>
+            </a:r>
+            <a:r>
+              <a:rPr lang="nb-NO" dirty="0"/>
+              <a:t> </a:t>
+            </a:r>
+            <a:r>
+              <a:rPr lang="nb-NO" dirty="0" err="1"/>
+              <a:t>the</a:t>
+            </a:r>
+            <a:r>
+              <a:rPr lang="nb-NO" dirty="0"/>
+              <a:t> </a:t>
+            </a:r>
+            <a:r>
+              <a:rPr lang="nb-NO" dirty="0" err="1"/>
+              <a:t>wavelet</a:t>
+            </a:r>
+            <a:r>
+              <a:rPr lang="nb-NO" dirty="0"/>
+              <a:t>?</a:t>
+            </a:r>
+          </a:p>
+          <a:p>
+            <a:pPr lvl="1"/>
+            <a:r>
+              <a:rPr lang="nb-NO" dirty="0"/>
+              <a:t>More </a:t>
+            </a:r>
+            <a:r>
+              <a:rPr lang="nb-NO" dirty="0" err="1"/>
+              <a:t>sophisticated</a:t>
+            </a:r>
+            <a:r>
+              <a:rPr lang="nb-NO" dirty="0"/>
+              <a:t> </a:t>
+            </a:r>
+            <a:r>
+              <a:rPr lang="nb-NO" dirty="0" err="1"/>
+              <a:t>modeling</a:t>
+            </a:r>
+            <a:r>
+              <a:rPr lang="nb-NO" dirty="0"/>
+              <a:t>?</a:t>
+            </a:r>
+          </a:p>
+          <a:p>
+            <a:pPr lvl="2"/>
+            <a:r>
+              <a:rPr lang="nb-NO" dirty="0" err="1"/>
+              <a:t>Reverse</a:t>
+            </a:r>
+            <a:r>
+              <a:rPr lang="nb-NO" dirty="0"/>
+              <a:t> time </a:t>
+            </a:r>
+            <a:r>
+              <a:rPr lang="nb-NO" dirty="0" err="1"/>
+              <a:t>migration</a:t>
+            </a:r>
+            <a:r>
+              <a:rPr lang="nb-NO" dirty="0"/>
+              <a:t> (used by Mustafa)</a:t>
+            </a:r>
+          </a:p>
+          <a:p>
+            <a:pPr marL="0" indent="0">
+              <a:buNone/>
+            </a:pPr>
+            <a:endParaRPr lang="en-GB" dirty="0"/>
+          </a:p>
+        </p:txBody>
+      </p:sp>
     </p:spTree>
     <p:extLst>
       <p:ext uri="{BB962C8B-B14F-4D97-AF65-F5344CB8AC3E}">
-        <p14:creationId xmlns:p14="http://schemas.microsoft.com/office/powerpoint/2010/main" val="2243019436"/>
+        <p14:creationId xmlns:p14="http://schemas.microsoft.com/office/powerpoint/2010/main" val="3208627913"/>
       </p:ext>
     </p:extLst>
   </p:cSld>
@@ -4594,6 +5420,138 @@
           <p:cNvPr id="5" name="Picture 4" descr="Chart&#10;&#10;Description automatically generated">
             <a:extLst>
               <a:ext uri="{FF2B5EF4-FFF2-40B4-BE49-F238E27FC236}">
+                <a16:creationId xmlns:a16="http://schemas.microsoft.com/office/drawing/2014/main" id="{8A2A78F7-683A-135D-FB1E-295828AB89FF}"/>
+              </a:ext>
+            </a:extLst>
+          </p:cNvPr>
+          <p:cNvPicPr>
+            <a:picLocks noChangeAspect="1"/>
+          </p:cNvPicPr>
+          <p:nvPr/>
+        </p:nvPicPr>
+        <p:blipFill>
+          <a:blip r:embed="rId2">
+            <a:extLst>
+              <a:ext uri="{28A0092B-C50C-407E-A947-70E740481C1C}">
+                <a14:useLocalDpi xmlns:a14="http://schemas.microsoft.com/office/drawing/2010/main" val="0"/>
+              </a:ext>
+            </a:extLst>
+          </a:blip>
+          <a:stretch>
+            <a:fillRect/>
+          </a:stretch>
+        </p:blipFill>
+        <p:spPr>
+          <a:xfrm>
+            <a:off x="1238250" y="0"/>
+            <a:ext cx="9477375" cy="6384648"/>
+          </a:xfrm>
+          <a:prstGeom prst="rect">
+            <a:avLst/>
+          </a:prstGeom>
+        </p:spPr>
+      </p:pic>
+    </p:spTree>
+    <p:extLst>
+      <p:ext uri="{BB962C8B-B14F-4D97-AF65-F5344CB8AC3E}">
+        <p14:creationId xmlns:p14="http://schemas.microsoft.com/office/powerpoint/2010/main" val="2243019436"/>
+      </p:ext>
+    </p:extLst>
+  </p:cSld>
+  <p:clrMapOvr>
+    <a:masterClrMapping/>
+  </p:clrMapOvr>
+</p:sld>
+</file>
+
+<file path=ppt/slides/slide7.xml><?xml version="1.0" encoding="utf-8"?>
+<p:sld xmlns:a="http://schemas.openxmlformats.org/drawingml/2006/main" xmlns:r="http://schemas.openxmlformats.org/officeDocument/2006/relationships" xmlns:p="http://schemas.openxmlformats.org/presentationml/2006/main">
+  <p:cSld>
+    <p:spTree>
+      <p:nvGrpSpPr>
+        <p:cNvPr id="1" name=""/>
+        <p:cNvGrpSpPr/>
+        <p:nvPr/>
+      </p:nvGrpSpPr>
+      <p:grpSpPr>
+        <a:xfrm>
+          <a:off x="0" y="0"/>
+          <a:ext cx="0" cy="0"/>
+          <a:chOff x="0" y="0"/>
+          <a:chExt cx="0" cy="0"/>
+        </a:xfrm>
+      </p:grpSpPr>
+      <p:pic>
+        <p:nvPicPr>
+          <p:cNvPr id="5" name="Picture 4" descr="Chart&#10;&#10;Description automatically generated">
+            <a:extLst>
+              <a:ext uri="{FF2B5EF4-FFF2-40B4-BE49-F238E27FC236}">
+                <a16:creationId xmlns:a16="http://schemas.microsoft.com/office/drawing/2014/main" id="{B7A9FAEF-D433-456A-A216-9B646A761756}"/>
+              </a:ext>
+            </a:extLst>
+          </p:cNvPr>
+          <p:cNvPicPr>
+            <a:picLocks noChangeAspect="1"/>
+          </p:cNvPicPr>
+          <p:nvPr/>
+        </p:nvPicPr>
+        <p:blipFill>
+          <a:blip r:embed="rId2">
+            <a:extLst>
+              <a:ext uri="{28A0092B-C50C-407E-A947-70E740481C1C}">
+                <a14:useLocalDpi xmlns:a14="http://schemas.microsoft.com/office/drawing/2010/main" val="0"/>
+              </a:ext>
+            </a:extLst>
+          </a:blip>
+          <a:stretch>
+            <a:fillRect/>
+          </a:stretch>
+        </p:blipFill>
+        <p:spPr>
+          <a:xfrm>
+            <a:off x="0" y="333375"/>
+            <a:ext cx="12192000" cy="6191250"/>
+          </a:xfrm>
+          <a:prstGeom prst="rect">
+            <a:avLst/>
+          </a:prstGeom>
+        </p:spPr>
+      </p:pic>
+    </p:spTree>
+    <p:extLst>
+      <p:ext uri="{BB962C8B-B14F-4D97-AF65-F5344CB8AC3E}">
+        <p14:creationId xmlns:p14="http://schemas.microsoft.com/office/powerpoint/2010/main" val="2935075197"/>
+      </p:ext>
+    </p:extLst>
+  </p:cSld>
+  <p:clrMapOvr>
+    <a:masterClrMapping/>
+  </p:clrMapOvr>
+</p:sld>
+</file>
+
+<file path=ppt/slides/slide8.xml><?xml version="1.0" encoding="utf-8"?>
+<p:sld xmlns:a="http://schemas.openxmlformats.org/drawingml/2006/main" xmlns:r="http://schemas.openxmlformats.org/officeDocument/2006/relationships" xmlns:p="http://schemas.openxmlformats.org/presentationml/2006/main">
+  <p:cSld>
+    <p:spTree>
+      <p:nvGrpSpPr>
+        <p:cNvPr id="1" name=""/>
+        <p:cNvGrpSpPr/>
+        <p:nvPr/>
+      </p:nvGrpSpPr>
+      <p:grpSpPr>
+        <a:xfrm>
+          <a:off x="0" y="0"/>
+          <a:ext cx="0" cy="0"/>
+          <a:chOff x="0" y="0"/>
+          <a:chExt cx="0" cy="0"/>
+        </a:xfrm>
+      </p:grpSpPr>
+      <p:pic>
+        <p:nvPicPr>
+          <p:cNvPr id="5" name="Picture 4" descr="Chart&#10;&#10;Description automatically generated">
+            <a:extLst>
+              <a:ext uri="{FF2B5EF4-FFF2-40B4-BE49-F238E27FC236}">
                 <a16:creationId xmlns:a16="http://schemas.microsoft.com/office/drawing/2014/main" id="{21D25EDE-3843-7D99-A37B-A823ACF6E418}"/>
               </a:ext>
             </a:extLst>
@@ -4674,7 +5632,7 @@
 </p:sld>
 </file>
 
-<file path=ppt/slides/slide7.xml><?xml version="1.0" encoding="utf-8"?>
+<file path=ppt/slides/slide9.xml><?xml version="1.0" encoding="utf-8"?>
 <p:sld xmlns:a="http://schemas.openxmlformats.org/drawingml/2006/main" xmlns:r="http://schemas.openxmlformats.org/officeDocument/2006/relationships" xmlns:p="http://schemas.openxmlformats.org/presentationml/2006/main">
   <p:cSld>
     <p:spTree>
@@ -4729,152 +5687,6 @@
     <p:extLst>
       <p:ext uri="{BB962C8B-B14F-4D97-AF65-F5344CB8AC3E}">
         <p14:creationId xmlns:p14="http://schemas.microsoft.com/office/powerpoint/2010/main" val="479443976"/>
-      </p:ext>
-    </p:extLst>
-  </p:cSld>
-  <p:clrMapOvr>
-    <a:masterClrMapping/>
-  </p:clrMapOvr>
-</p:sld>
-</file>
-
-<file path=ppt/slides/slide8.xml><?xml version="1.0" encoding="utf-8"?>
-<p:sld xmlns:a="http://schemas.openxmlformats.org/drawingml/2006/main" xmlns:r="http://schemas.openxmlformats.org/officeDocument/2006/relationships" xmlns:p="http://schemas.openxmlformats.org/presentationml/2006/main">
-  <p:cSld>
-    <p:spTree>
-      <p:nvGrpSpPr>
-        <p:cNvPr id="1" name=""/>
-        <p:cNvGrpSpPr/>
-        <p:nvPr/>
-      </p:nvGrpSpPr>
-      <p:grpSpPr>
-        <a:xfrm>
-          <a:off x="0" y="0"/>
-          <a:ext cx="0" cy="0"/>
-          <a:chOff x="0" y="0"/>
-          <a:chExt cx="0" cy="0"/>
-        </a:xfrm>
-      </p:grpSpPr>
-      <p:sp>
-        <p:nvSpPr>
-          <p:cNvPr id="2" name="Title 1">
-            <a:extLst>
-              <a:ext uri="{FF2B5EF4-FFF2-40B4-BE49-F238E27FC236}">
-                <a16:creationId xmlns:a16="http://schemas.microsoft.com/office/drawing/2014/main" id="{92C0EC3A-11DB-4107-AA5F-293F6AE04682}"/>
-              </a:ext>
-            </a:extLst>
-          </p:cNvPr>
-          <p:cNvSpPr>
-            <a:spLocks noGrp="1"/>
-          </p:cNvSpPr>
-          <p:nvPr>
-            <p:ph type="title"/>
-          </p:nvPr>
-        </p:nvSpPr>
-        <p:spPr/>
-        <p:txBody>
-          <a:bodyPr/>
-          <a:lstStyle/>
-          <a:p>
-            <a:r>
-              <a:rPr lang="nb-NO" dirty="0" err="1"/>
-              <a:t>writing</a:t>
-            </a:r>
-            <a:endParaRPr lang="en-GB" dirty="0"/>
-          </a:p>
-        </p:txBody>
-      </p:sp>
-      <p:sp>
-        <p:nvSpPr>
-          <p:cNvPr id="3" name="Content Placeholder 2">
-            <a:extLst>
-              <a:ext uri="{FF2B5EF4-FFF2-40B4-BE49-F238E27FC236}">
-                <a16:creationId xmlns:a16="http://schemas.microsoft.com/office/drawing/2014/main" id="{2110F2EF-2002-4B69-9B30-755335B94858}"/>
-              </a:ext>
-            </a:extLst>
-          </p:cNvPr>
-          <p:cNvSpPr>
-            <a:spLocks noGrp="1"/>
-          </p:cNvSpPr>
-          <p:nvPr>
-            <p:ph idx="1"/>
-          </p:nvPr>
-        </p:nvSpPr>
-        <p:spPr/>
-        <p:txBody>
-          <a:bodyPr/>
-          <a:lstStyle/>
-          <a:p>
-            <a:r>
-              <a:rPr lang="nb-NO" dirty="0"/>
-              <a:t>For ML </a:t>
-            </a:r>
-            <a:r>
-              <a:rPr lang="nb-NO" dirty="0" err="1"/>
-              <a:t>I’m</a:t>
-            </a:r>
-            <a:r>
-              <a:rPr lang="nb-NO" dirty="0"/>
-              <a:t> </a:t>
-            </a:r>
-            <a:r>
-              <a:rPr lang="nb-NO" dirty="0" err="1"/>
-              <a:t>using</a:t>
-            </a:r>
-            <a:r>
-              <a:rPr lang="nb-NO" dirty="0"/>
-              <a:t> Tom </a:t>
-            </a:r>
-            <a:r>
-              <a:rPr lang="nb-NO" dirty="0" err="1"/>
-              <a:t>Mitchell’s</a:t>
-            </a:r>
-            <a:r>
-              <a:rPr lang="nb-NO" dirty="0"/>
-              <a:t> book «Machine Learning»</a:t>
-            </a:r>
-          </a:p>
-          <a:p>
-            <a:r>
-              <a:rPr lang="nb-NO" dirty="0" err="1"/>
-              <a:t>Also</a:t>
-            </a:r>
-            <a:r>
-              <a:rPr lang="nb-NO" dirty="0"/>
-              <a:t> </a:t>
-            </a:r>
-            <a:r>
-              <a:rPr lang="nb-NO" dirty="0" err="1"/>
-              <a:t>other</a:t>
-            </a:r>
-            <a:r>
-              <a:rPr lang="nb-NO" dirty="0"/>
-              <a:t> </a:t>
-            </a:r>
-            <a:r>
-              <a:rPr lang="nb-NO" dirty="0" err="1"/>
-              <a:t>sources</a:t>
-            </a:r>
-            <a:r>
-              <a:rPr lang="nb-NO" dirty="0"/>
-              <a:t> from </a:t>
-            </a:r>
-            <a:r>
-              <a:rPr lang="nb-NO" dirty="0" err="1"/>
-              <a:t>papers</a:t>
-            </a:r>
-            <a:r>
-              <a:rPr lang="nb-NO"/>
-              <a:t>.</a:t>
-            </a:r>
-            <a:endParaRPr lang="en-GB"/>
-          </a:p>
-        </p:txBody>
-      </p:sp>
-    </p:spTree>
-    <p:extLst>
-      <p:ext uri="{BB962C8B-B14F-4D97-AF65-F5344CB8AC3E}">
-        <p14:creationId xmlns:p14="http://schemas.microsoft.com/office/powerpoint/2010/main" val="3753794754"/>
       </p:ext>
     </p:extLst>
   </p:cSld>

</xml_diff>